<commit_message>
Updated schedule and added it to the Word document
</commit_message>
<xml_diff>
--- a/Proposal_for_the_restaurant_ordering_amalgamation_system.pptx
+++ b/Proposal_for_the_restaurant_ordering_amalgamation_system.pptx
@@ -216,7 +216,7 @@
           <a:effectLst/>
           <a:extLst>
             <a:ext uri="{91240B29-F687-4f45-9708-019B960494DF}">
-              <a14:hiddenLine xmlns="" xmlns:a14="http://schemas.microsoft.com/office/drawing/2010/main" w="9525">
+              <a14:hiddenLine xmlns:a14="http://schemas.microsoft.com/office/drawing/2010/main" xmlns="" w="9525">
                 <a:solidFill>
                   <a:srgbClr val="000000"/>
                 </a:solidFill>
@@ -1726,7 +1726,7 @@
           <a:ln/>
           <a:extLst>
             <a:ext uri="{91240B29-F687-4f45-9708-019B960494DF}">
-              <a14:hiddenLine xmlns="" xmlns:a14="http://schemas.microsoft.com/office/drawing/2010/main" w="9525">
+              <a14:hiddenLine xmlns:a14="http://schemas.microsoft.com/office/drawing/2010/main" xmlns="" w="9525">
                 <a:solidFill>
                   <a:srgbClr val="000000"/>
                 </a:solidFill>
@@ -1998,7 +1998,7 @@
           <a:ln/>
           <a:extLst>
             <a:ext uri="{91240B29-F687-4f45-9708-019B960494DF}">
-              <a14:hiddenLine xmlns="" xmlns:a14="http://schemas.microsoft.com/office/drawing/2010/main" w="9525">
+              <a14:hiddenLine xmlns:a14="http://schemas.microsoft.com/office/drawing/2010/main" xmlns="" w="9525">
                 <a:solidFill>
                   <a:srgbClr val="000000"/>
                 </a:solidFill>
@@ -2278,7 +2278,7 @@
           <a:ln/>
           <a:extLst>
             <a:ext uri="{91240B29-F687-4f45-9708-019B960494DF}">
-              <a14:hiddenLine xmlns="" xmlns:a14="http://schemas.microsoft.com/office/drawing/2010/main" w="9525">
+              <a14:hiddenLine xmlns:a14="http://schemas.microsoft.com/office/drawing/2010/main" xmlns="" w="9525">
                 <a:solidFill>
                   <a:srgbClr val="000000"/>
                 </a:solidFill>
@@ -2898,7 +2898,7 @@
           <a:ln/>
           <a:extLst>
             <a:ext uri="{91240B29-F687-4f45-9708-019B960494DF}">
-              <a14:hiddenLine xmlns="" xmlns:a14="http://schemas.microsoft.com/office/drawing/2010/main" w="9525">
+              <a14:hiddenLine xmlns:a14="http://schemas.microsoft.com/office/drawing/2010/main" xmlns="" w="9525">
                 <a:solidFill>
                   <a:srgbClr val="000000"/>
                 </a:solidFill>
@@ -3234,7 +3234,7 @@
           <a:ln/>
           <a:extLst>
             <a:ext uri="{91240B29-F687-4f45-9708-019B960494DF}">
-              <a14:hiddenLine xmlns="" xmlns:a14="http://schemas.microsoft.com/office/drawing/2010/main" w="9525">
+              <a14:hiddenLine xmlns:a14="http://schemas.microsoft.com/office/drawing/2010/main" xmlns="" w="9525">
                 <a:solidFill>
                   <a:srgbClr val="000000"/>
                 </a:solidFill>
@@ -3708,7 +3708,7 @@
           <a:ln/>
           <a:extLst>
             <a:ext uri="{91240B29-F687-4f45-9708-019B960494DF}">
-              <a14:hiddenLine xmlns="" xmlns:a14="http://schemas.microsoft.com/office/drawing/2010/main" w="9525">
+              <a14:hiddenLine xmlns:a14="http://schemas.microsoft.com/office/drawing/2010/main" xmlns="" w="9525">
                 <a:solidFill>
                   <a:srgbClr val="000000"/>
                 </a:solidFill>
@@ -4131,7 +4131,7 @@
           <a:ln/>
           <a:extLst>
             <a:ext uri="{91240B29-F687-4f45-9708-019B960494DF}">
-              <a14:hiddenLine xmlns="" xmlns:a14="http://schemas.microsoft.com/office/drawing/2010/main" w="9525">
+              <a14:hiddenLine xmlns:a14="http://schemas.microsoft.com/office/drawing/2010/main" xmlns="" w="9525">
                 <a:solidFill>
                   <a:srgbClr val="000000"/>
                 </a:solidFill>
@@ -6257,25 +6257,6 @@
           </a:p>
         </p:txBody>
       </p:sp>
-      <p:sp>
-        <p:nvSpPr>
-          <p:cNvPr id="3" name="Content Placeholder 2"/>
-          <p:cNvSpPr>
-            <a:spLocks noGrp="1"/>
-          </p:cNvSpPr>
-          <p:nvPr>
-            <p:ph idx="1"/>
-          </p:nvPr>
-        </p:nvSpPr>
-        <p:spPr/>
-        <p:txBody>
-          <a:bodyPr/>
-          <a:lstStyle/>
-          <a:p>
-            <a:endParaRPr lang="en-ZA"/>
-          </a:p>
-        </p:txBody>
-      </p:sp>
       <p:graphicFrame>
         <p:nvGraphicFramePr>
           <p:cNvPr id="4" name="Content Placeholder 3"/>
@@ -6285,14 +6266,14 @@
           <p:nvPr>
             <p:extLst>
               <p:ext uri="{D42A27DB-BD31-4B8C-83A1-F6EECF244321}">
-                <p14:modId xmlns:p14="http://schemas.microsoft.com/office/powerpoint/2010/main" val="2627197427"/>
+                <p14:modId xmlns:p14="http://schemas.microsoft.com/office/powerpoint/2010/main" val="56988737"/>
               </p:ext>
             </p:extLst>
           </p:nvPr>
         </p:nvGraphicFramePr>
         <p:xfrm>
-          <a:off x="1021968" y="1327742"/>
-          <a:ext cx="10148064" cy="5425600"/>
+          <a:off x="1021967" y="1482501"/>
+          <a:ext cx="10148064" cy="4855069"/>
         </p:xfrm>
         <a:graphic>
           <a:graphicData uri="http://schemas.openxmlformats.org/drawingml/2006/table">
@@ -6323,7 +6304,7 @@
                   </a:extLst>
                 </a:gridCol>
               </a:tblGrid>
-              <a:tr h="474640">
+              <a:tr h="426605">
                 <a:tc>
                   <a:txBody>
                     <a:bodyPr/>
@@ -6389,13 +6370,13 @@
                         </a:spcAft>
                       </a:pPr>
                       <a:r>
-                        <a:rPr lang="en-GB" sz="1400" b="1" dirty="0">
+                        <a:rPr lang="en-ZA" sz="1400" b="1" dirty="0">
                           <a:effectLst/>
                           <a:latin typeface="Arial" panose="020B0604020202020204" pitchFamily="34" charset="0"/>
                           <a:ea typeface="Times New Roman" panose="02020603050405020304" pitchFamily="18" charset="0"/>
                           <a:cs typeface="Arial" panose="020B0604020202020204" pitchFamily="34" charset="0"/>
                         </a:rPr>
-                        <a:t>Steps Implemented</a:t>
+                        <a:t>Detail</a:t>
                       </a:r>
                       <a:endParaRPr lang="en-ZA" sz="1100" dirty="0">
                         <a:effectLst/>
@@ -6456,15 +6437,15 @@
                         </a:spcAft>
                       </a:pPr>
                       <a:r>
-                        <a:rPr lang="en-GB" sz="1400" b="1">
+                        <a:rPr lang="en-GB" sz="1400" b="1" dirty="0">
                           <a:effectLst/>
                           <a:latin typeface="Arial" panose="020B0604020202020204" pitchFamily="34" charset="0"/>
                           <a:ea typeface="Times New Roman" panose="02020603050405020304" pitchFamily="18" charset="0"/>
                           <a:cs typeface="Arial" panose="020B0604020202020204" pitchFamily="34" charset="0"/>
                         </a:rPr>
-                        <a:t>Proposed date</a:t>
+                        <a:t>Date</a:t>
                       </a:r>
-                      <a:endParaRPr lang="en-ZA" sz="1100">
+                      <a:endParaRPr lang="en-ZA" sz="1100" dirty="0">
                         <a:effectLst/>
                         <a:latin typeface="Arial" panose="020B0604020202020204" pitchFamily="34" charset="0"/>
                         <a:ea typeface="Times New Roman" panose="02020603050405020304" pitchFamily="18" charset="0"/>
@@ -6499,7 +6480,7 @@
                   </a:ext>
                 </a:extLst>
               </a:tr>
-              <a:tr h="237320">
+              <a:tr h="207012">
                 <a:tc>
                   <a:txBody>
                     <a:bodyPr/>
@@ -6624,7 +6605,7 @@
                   </a:ext>
                 </a:extLst>
               </a:tr>
-              <a:tr h="522749">
+              <a:tr h="455989">
                 <a:tc>
                   <a:txBody>
                     <a:bodyPr/>
@@ -6715,7 +6696,7 @@
                         </a:spcAft>
                       </a:pPr>
                       <a:r>
-                        <a:rPr lang="en-GB" sz="1400">
+                        <a:rPr lang="en-GB" sz="1400" dirty="0">
                           <a:effectLst/>
                           <a:latin typeface="Arial" panose="020B0604020202020204" pitchFamily="34" charset="0"/>
                           <a:ea typeface="Times New Roman" panose="02020603050405020304" pitchFamily="18" charset="0"/>
@@ -6723,7 +6704,7 @@
                         </a:rPr>
                         <a:t>25-02-2019</a:t>
                       </a:r>
-                      <a:endParaRPr lang="en-ZA" sz="1100">
+                      <a:endParaRPr lang="en-ZA" sz="1100" dirty="0">
                         <a:effectLst/>
                         <a:latin typeface="Arial" panose="020B0604020202020204" pitchFamily="34" charset="0"/>
                         <a:ea typeface="Times New Roman" panose="02020603050405020304" pitchFamily="18" charset="0"/>
@@ -6749,7 +6730,7 @@
                   </a:ext>
                 </a:extLst>
               </a:tr>
-              <a:tr h="359926">
+              <a:tr h="313960">
                 <a:tc>
                   <a:txBody>
                     <a:bodyPr/>
@@ -6840,47 +6821,14 @@
                         </a:spcAft>
                       </a:pPr>
                       <a:r>
-                        <a:rPr lang="en-GB" sz="1400" dirty="0">
-                          <a:solidFill>
-                            <a:srgbClr val="FF0000"/>
-                          </a:solidFill>
+                        <a:rPr lang="en-ZA" sz="1400" dirty="0">
                           <a:effectLst/>
                           <a:latin typeface="Arial" panose="020B0604020202020204" pitchFamily="34" charset="0"/>
                           <a:ea typeface="Times New Roman" panose="02020603050405020304" pitchFamily="18" charset="0"/>
                           <a:cs typeface="Arial" panose="020B0604020202020204" pitchFamily="34" charset="0"/>
                         </a:rPr>
-                        <a:t>Complete</a:t>
+                        <a:t>29-05-2019</a:t>
                       </a:r>
-                      <a:r>
-                        <a:rPr lang="en-GB" sz="1400" baseline="0" dirty="0">
-                          <a:solidFill>
-                            <a:srgbClr val="FF0000"/>
-                          </a:solidFill>
-                          <a:effectLst/>
-                          <a:latin typeface="Arial" panose="020B0604020202020204" pitchFamily="34" charset="0"/>
-                          <a:ea typeface="Times New Roman" panose="02020603050405020304" pitchFamily="18" charset="0"/>
-                          <a:cs typeface="Arial" panose="020B0604020202020204" pitchFamily="34" charset="0"/>
-                        </a:rPr>
-                        <a:t> </a:t>
-                      </a:r>
-                      <a:r>
-                        <a:rPr lang="en-GB" sz="1400" dirty="0">
-                          <a:solidFill>
-                            <a:srgbClr val="FF0000"/>
-                          </a:solidFill>
-                          <a:effectLst/>
-                          <a:latin typeface="Arial" panose="020B0604020202020204" pitchFamily="34" charset="0"/>
-                          <a:ea typeface="Times New Roman" panose="02020603050405020304" pitchFamily="18" charset="0"/>
-                          <a:cs typeface="Arial" panose="020B0604020202020204" pitchFamily="34" charset="0"/>
-                        </a:rPr>
-                        <a:t>dates</a:t>
-                      </a:r>
-                      <a:endParaRPr lang="en-ZA" sz="1100" dirty="0">
-                        <a:effectLst/>
-                        <a:latin typeface="Arial" panose="020B0604020202020204" pitchFamily="34" charset="0"/>
-                        <a:ea typeface="Times New Roman" panose="02020603050405020304" pitchFamily="18" charset="0"/>
-                        <a:cs typeface="Arial" panose="020B0604020202020204" pitchFamily="34" charset="0"/>
-                      </a:endParaRPr>
                     </a:p>
                   </a:txBody>
                   <a:tcPr marL="68580" marR="68580" marT="0" marB="0">
@@ -6901,7 +6849,7 @@
                   </a:ext>
                 </a:extLst>
               </a:tr>
-              <a:tr h="227002">
+              <a:tr h="198012">
                 <a:tc>
                   <a:txBody>
                     <a:bodyPr/>
@@ -6992,23 +6940,14 @@
                         </a:spcAft>
                       </a:pPr>
                       <a:r>
-                        <a:rPr lang="en-GB" sz="1400" dirty="0">
-                          <a:solidFill>
-                            <a:srgbClr val="FF0000"/>
-                          </a:solidFill>
+                        <a:rPr lang="en-ZA" sz="1400" dirty="0">
                           <a:effectLst/>
                           <a:latin typeface="Arial" panose="020B0604020202020204" pitchFamily="34" charset="0"/>
                           <a:ea typeface="Times New Roman" panose="02020603050405020304" pitchFamily="18" charset="0"/>
                           <a:cs typeface="Arial" panose="020B0604020202020204" pitchFamily="34" charset="0"/>
                         </a:rPr>
-                        <a:t>Complete dates</a:t>
+                        <a:t>29-05-2019</a:t>
                       </a:r>
-                      <a:endParaRPr lang="en-ZA" sz="1100" dirty="0">
-                        <a:effectLst/>
-                        <a:latin typeface="Arial" panose="020B0604020202020204" pitchFamily="34" charset="0"/>
-                        <a:ea typeface="Times New Roman" panose="02020603050405020304" pitchFamily="18" charset="0"/>
-                        <a:cs typeface="Arial" panose="020B0604020202020204" pitchFamily="34" charset="0"/>
-                      </a:endParaRPr>
                     </a:p>
                   </a:txBody>
                   <a:tcPr marL="68580" marR="68580" marT="0" marB="0">
@@ -7029,7 +6968,7 @@
                   </a:ext>
                 </a:extLst>
               </a:tr>
-              <a:tr h="831640">
+              <a:tr h="725430">
                 <a:tc>
                   <a:txBody>
                     <a:bodyPr/>
@@ -7143,32 +7082,57 @@
                     <a:bodyPr/>
                     <a:lstStyle/>
                     <a:p>
-                      <a:pPr>
+                      <a:pPr marL="0" marR="0" lvl="0" indent="0" algn="l" defTabSz="457200" rtl="0" eaLnBrk="1" fontAlgn="auto" latinLnBrk="0" hangingPunct="1">
                         <a:lnSpc>
                           <a:spcPct val="110000"/>
                         </a:lnSpc>
+                        <a:spcBef>
+                          <a:spcPts val="0"/>
+                        </a:spcBef>
                         <a:spcAft>
                           <a:spcPts val="0"/>
                         </a:spcAft>
+                        <a:buClrTx/>
+                        <a:buSzTx/>
+                        <a:buFontTx/>
+                        <a:buNone/>
+                        <a:tabLst/>
+                        <a:defRPr/>
+                      </a:pPr>
+                      <a:endParaRPr lang="en-ZA" sz="1400" dirty="0">
+                        <a:effectLst/>
+                        <a:latin typeface="Arial" panose="020B0604020202020204" pitchFamily="34" charset="0"/>
+                        <a:ea typeface="Times New Roman" panose="02020603050405020304" pitchFamily="18" charset="0"/>
+                        <a:cs typeface="Arial" panose="020B0604020202020204" pitchFamily="34" charset="0"/>
+                      </a:endParaRPr>
+                    </a:p>
+                    <a:p>
+                      <a:pPr marL="0" marR="0" lvl="0" indent="0" algn="l" defTabSz="457200" rtl="0" eaLnBrk="1" fontAlgn="auto" latinLnBrk="0" hangingPunct="1">
+                        <a:lnSpc>
+                          <a:spcPct val="110000"/>
+                        </a:lnSpc>
+                        <a:spcBef>
+                          <a:spcPts val="0"/>
+                        </a:spcBef>
+                        <a:spcAft>
+                          <a:spcPts val="0"/>
+                        </a:spcAft>
+                        <a:buClrTx/>
+                        <a:buSzTx/>
+                        <a:buFontTx/>
+                        <a:buNone/>
+                        <a:tabLst/>
+                        <a:defRPr/>
                       </a:pPr>
                       <a:r>
-                        <a:rPr lang="en-GB" sz="1400">
-                          <a:solidFill>
-                            <a:srgbClr val="FF0000"/>
-                          </a:solidFill>
+                        <a:rPr lang="en-ZA" sz="1400" dirty="0">
                           <a:effectLst/>
                           <a:latin typeface="Arial" panose="020B0604020202020204" pitchFamily="34" charset="0"/>
                           <a:ea typeface="Times New Roman" panose="02020603050405020304" pitchFamily="18" charset="0"/>
                           <a:cs typeface="Arial" panose="020B0604020202020204" pitchFamily="34" charset="0"/>
                         </a:rPr>
-                        <a:t>Complete dates</a:t>
+                        <a:t>29-05-2019</a:t>
                       </a:r>
-                      <a:endParaRPr lang="en-ZA" sz="1100">
-                        <a:effectLst/>
-                        <a:latin typeface="Arial" panose="020B0604020202020204" pitchFamily="34" charset="0"/>
-                        <a:ea typeface="Times New Roman" panose="02020603050405020304" pitchFamily="18" charset="0"/>
-                        <a:cs typeface="Arial" panose="020B0604020202020204" pitchFamily="34" charset="0"/>
-                      </a:endParaRPr>
                     </a:p>
                   </a:txBody>
                   <a:tcPr marL="68580" marR="68580" marT="0" marB="0">
@@ -7189,7 +7153,7 @@
                   </a:ext>
                 </a:extLst>
               </a:tr>
-              <a:tr h="802630">
+              <a:tr h="700126">
                 <a:tc>
                   <a:txBody>
                     <a:bodyPr/>
@@ -7366,23 +7330,14 @@
                         </a:spcAft>
                       </a:pPr>
                       <a:r>
-                        <a:rPr lang="en-GB" sz="1400" dirty="0">
-                          <a:solidFill>
-                            <a:srgbClr val="FF0000"/>
-                          </a:solidFill>
+                        <a:rPr lang="en-ZA" sz="1400" dirty="0">
                           <a:effectLst/>
                           <a:latin typeface="Arial" panose="020B0604020202020204" pitchFamily="34" charset="0"/>
                           <a:ea typeface="Times New Roman" panose="02020603050405020304" pitchFamily="18" charset="0"/>
                           <a:cs typeface="Arial" panose="020B0604020202020204" pitchFamily="34" charset="0"/>
                         </a:rPr>
-                        <a:t>Complete dates</a:t>
+                        <a:t>2018-10-25</a:t>
                       </a:r>
-                      <a:endParaRPr lang="en-ZA" sz="1100" dirty="0">
-                        <a:effectLst/>
-                        <a:latin typeface="Arial" panose="020B0604020202020204" pitchFamily="34" charset="0"/>
-                        <a:ea typeface="Times New Roman" panose="02020603050405020304" pitchFamily="18" charset="0"/>
-                        <a:cs typeface="Arial" panose="020B0604020202020204" pitchFamily="34" charset="0"/>
-                      </a:endParaRPr>
                     </a:p>
                   </a:txBody>
                   <a:tcPr marL="68580" marR="68580" marT="0" marB="0">
@@ -7403,7 +7358,7 @@
                   </a:ext>
                 </a:extLst>
               </a:tr>
-              <a:tr h="893697">
+              <a:tr h="838969">
                 <a:tc>
                   <a:txBody>
                     <a:bodyPr/>
@@ -7470,7 +7425,52 @@
                           <a:ea typeface="Times New Roman" panose="02020603050405020304" pitchFamily="18" charset="0"/>
                           <a:cs typeface="Arial" panose="020B0604020202020204" pitchFamily="34" charset="0"/>
                         </a:rPr>
-                        <a:t>Database</a:t>
+                        <a:t>Database (Firebase/MySQL)</a:t>
+                      </a:r>
+                      <a:endParaRPr lang="en-ZA" sz="1800" b="1" dirty="0">
+                        <a:effectLst/>
+                        <a:latin typeface="Arial" panose="020B0604020202020204" pitchFamily="34" charset="0"/>
+                        <a:ea typeface="Times New Roman" panose="02020603050405020304" pitchFamily="18" charset="0"/>
+                        <a:cs typeface="Arial" panose="020B0604020202020204" pitchFamily="34" charset="0"/>
+                      </a:endParaRPr>
+                    </a:p>
+                    <a:p>
+                      <a:pPr marL="342900" lvl="0" indent="-342900" algn="l">
+                        <a:spcAft>
+                          <a:spcPts val="0"/>
+                        </a:spcAft>
+                        <a:buFont typeface="Symbol" panose="05050102010706020507" pitchFamily="18" charset="2"/>
+                        <a:buChar char=""/>
+                        <a:tabLst>
+                          <a:tab pos="228600" algn="l"/>
+                        </a:tabLst>
+                      </a:pPr>
+                      <a:r>
+                        <a:rPr lang="en-ZA" sz="1200" b="0" dirty="0">
+                          <a:effectLst/>
+                          <a:latin typeface="Arial" panose="020B0604020202020204" pitchFamily="34" charset="0"/>
+                          <a:ea typeface="Times New Roman" panose="02020603050405020304" pitchFamily="18" charset="0"/>
+                          <a:cs typeface="Arial" panose="020B0604020202020204" pitchFamily="34" charset="0"/>
+                        </a:rPr>
+                        <a:t>Back end setup (Node.js/</a:t>
+                      </a:r>
+                      <a:r>
+                        <a:rPr lang="en-ZA" sz="1200" b="0" dirty="0" err="1">
+                          <a:effectLst/>
+                          <a:latin typeface="Arial" panose="020B0604020202020204" pitchFamily="34" charset="0"/>
+                          <a:ea typeface="Times New Roman" panose="02020603050405020304" pitchFamily="18" charset="0"/>
+                          <a:cs typeface="Arial" panose="020B0604020202020204" pitchFamily="34" charset="0"/>
+                        </a:rPr>
+                        <a:t>PhP</a:t>
+                      </a:r>
+                      <a:r>
+                        <a:rPr lang="en-ZA" sz="1200" b="0" dirty="0">
+                          <a:effectLst/>
+                          <a:latin typeface="Arial" panose="020B0604020202020204" pitchFamily="34" charset="0"/>
+                          <a:ea typeface="Times New Roman" panose="02020603050405020304" pitchFamily="18" charset="0"/>
+                          <a:cs typeface="Arial" panose="020B0604020202020204" pitchFamily="34" charset="0"/>
+                        </a:rPr>
+                        <a:t>/Python)</a:t>
                       </a:r>
                       <a:endParaRPr lang="en-ZA" sz="1800" b="1" dirty="0">
                         <a:effectLst/>
@@ -7497,7 +7497,7 @@
                           <a:ea typeface="Times New Roman" panose="02020603050405020304" pitchFamily="18" charset="0"/>
                           <a:cs typeface="Arial" panose="020B0604020202020204" pitchFamily="34" charset="0"/>
                         </a:rPr>
-                        <a:t>Custom-built software</a:t>
+                        <a:t>Web interface set up</a:t>
                       </a:r>
                       <a:endParaRPr lang="en-ZA" sz="1800" b="1" dirty="0">
                         <a:effectLst/>
@@ -7524,61 +7524,9 @@
                           <a:ea typeface="Times New Roman" panose="02020603050405020304" pitchFamily="18" charset="0"/>
                           <a:cs typeface="Arial" panose="020B0604020202020204" pitchFamily="34" charset="0"/>
                         </a:rPr>
-                        <a:t>User Interfaces (Windows or Web)</a:t>
+                        <a:t>Testing</a:t>
                       </a:r>
                       <a:endParaRPr lang="en-ZA" sz="1800" b="1" dirty="0">
-                        <a:effectLst/>
-                        <a:latin typeface="Arial" panose="020B0604020202020204" pitchFamily="34" charset="0"/>
-                        <a:ea typeface="Times New Roman" panose="02020603050405020304" pitchFamily="18" charset="0"/>
-                        <a:cs typeface="Arial" panose="020B0604020202020204" pitchFamily="34" charset="0"/>
-                      </a:endParaRPr>
-                    </a:p>
-                    <a:p>
-                      <a:pPr marL="342900" lvl="0" indent="-342900" algn="l">
-                        <a:spcAft>
-                          <a:spcPts val="0"/>
-                        </a:spcAft>
-                        <a:buFont typeface="Symbol" panose="05050102010706020507" pitchFamily="18" charset="2"/>
-                        <a:buChar char=""/>
-                        <a:tabLst>
-                          <a:tab pos="228600" algn="l"/>
-                        </a:tabLst>
-                      </a:pPr>
-                      <a:r>
-                        <a:rPr lang="en-GB" sz="1200" b="0" dirty="0">
-                          <a:effectLst/>
-                          <a:latin typeface="Arial" panose="020B0604020202020204" pitchFamily="34" charset="0"/>
-                          <a:ea typeface="Times New Roman" panose="02020603050405020304" pitchFamily="18" charset="0"/>
-                          <a:cs typeface="Arial" panose="020B0604020202020204" pitchFamily="34" charset="0"/>
-                        </a:rPr>
-                        <a:t>Test plan</a:t>
-                      </a:r>
-                      <a:endParaRPr lang="en-ZA" sz="1800" b="1" dirty="0">
-                        <a:effectLst/>
-                        <a:latin typeface="Arial" panose="020B0604020202020204" pitchFamily="34" charset="0"/>
-                        <a:ea typeface="Times New Roman" panose="02020603050405020304" pitchFamily="18" charset="0"/>
-                        <a:cs typeface="Arial" panose="020B0604020202020204" pitchFamily="34" charset="0"/>
-                      </a:endParaRPr>
-                    </a:p>
-                    <a:p>
-                      <a:pPr>
-                        <a:lnSpc>
-                          <a:spcPct val="115000"/>
-                        </a:lnSpc>
-                        <a:spcAft>
-                          <a:spcPts val="0"/>
-                        </a:spcAft>
-                      </a:pPr>
-                      <a:r>
-                        <a:rPr lang="en-GB" sz="1200" dirty="0">
-                          <a:effectLst/>
-                          <a:latin typeface="Arial" panose="020B0604020202020204" pitchFamily="34" charset="0"/>
-                          <a:ea typeface="Times New Roman" panose="02020603050405020304" pitchFamily="18" charset="0"/>
-                          <a:cs typeface="Arial" panose="020B0604020202020204" pitchFamily="34" charset="0"/>
-                        </a:rPr>
-                        <a:t> </a:t>
-                      </a:r>
-                      <a:endParaRPr lang="en-ZA" sz="1050" dirty="0">
                         <a:effectLst/>
                         <a:latin typeface="Arial" panose="020B0604020202020204" pitchFamily="34" charset="0"/>
                         <a:ea typeface="Times New Roman" panose="02020603050405020304" pitchFamily="18" charset="0"/>
@@ -7602,23 +7550,14 @@
                         </a:spcAft>
                       </a:pPr>
                       <a:r>
-                        <a:rPr lang="en-GB" sz="1400" dirty="0">
-                          <a:solidFill>
-                            <a:srgbClr val="FF0000"/>
-                          </a:solidFill>
+                        <a:rPr lang="en-ZA" sz="1400" dirty="0">
                           <a:effectLst/>
                           <a:latin typeface="Arial" panose="020B0604020202020204" pitchFamily="34" charset="0"/>
                           <a:ea typeface="Times New Roman" panose="02020603050405020304" pitchFamily="18" charset="0"/>
                           <a:cs typeface="Arial" panose="020B0604020202020204" pitchFamily="34" charset="0"/>
                         </a:rPr>
-                        <a:t>Complete dates</a:t>
+                        <a:t>2018-10-25</a:t>
                       </a:r>
-                      <a:endParaRPr lang="en-ZA" sz="1100" dirty="0">
-                        <a:effectLst/>
-                        <a:latin typeface="Arial" panose="020B0604020202020204" pitchFamily="34" charset="0"/>
-                        <a:ea typeface="Times New Roman" panose="02020603050405020304" pitchFamily="18" charset="0"/>
-                        <a:cs typeface="Arial" panose="020B0604020202020204" pitchFamily="34" charset="0"/>
-                      </a:endParaRPr>
                     </a:p>
                   </a:txBody>
                   <a:tcPr marL="68580" marR="68580" marT="0" marB="0">
@@ -7639,7 +7578,7 @@
                   </a:ext>
                 </a:extLst>
               </a:tr>
-              <a:tr h="996035">
+              <a:tr h="868830">
                 <a:tc>
                   <a:txBody>
                     <a:bodyPr/>
@@ -7805,31 +7744,6 @@
                         <a:cs typeface="Arial" panose="020B0604020202020204" pitchFamily="34" charset="0"/>
                       </a:endParaRPr>
                     </a:p>
-                    <a:p>
-                      <a:pPr>
-                        <a:lnSpc>
-                          <a:spcPct val="115000"/>
-                        </a:lnSpc>
-                        <a:spcAft>
-                          <a:spcPts val="0"/>
-                        </a:spcAft>
-                      </a:pPr>
-                      <a:r>
-                        <a:rPr lang="en-GB" sz="1200" dirty="0">
-                          <a:effectLst/>
-                          <a:latin typeface="Arial" panose="020B0604020202020204" pitchFamily="34" charset="0"/>
-                          <a:ea typeface="Times New Roman" panose="02020603050405020304" pitchFamily="18" charset="0"/>
-                          <a:cs typeface="Arial" panose="020B0604020202020204" pitchFamily="34" charset="0"/>
-                        </a:rPr>
-                        <a:t> </a:t>
-                      </a:r>
-                      <a:endParaRPr lang="en-ZA" sz="1050" dirty="0">
-                        <a:effectLst/>
-                        <a:latin typeface="Arial" panose="020B0604020202020204" pitchFamily="34" charset="0"/>
-                        <a:ea typeface="Times New Roman" panose="02020603050405020304" pitchFamily="18" charset="0"/>
-                        <a:cs typeface="Arial" panose="020B0604020202020204" pitchFamily="34" charset="0"/>
-                      </a:endParaRPr>
-                    </a:p>
                   </a:txBody>
                   <a:tcPr marL="68580" marR="68580" marT="0" marB="0">
                     <a:lnB w="12700" cap="flat" cmpd="sng" algn="ctr">
@@ -7857,23 +7771,14 @@
                         </a:spcAft>
                       </a:pPr>
                       <a:r>
-                        <a:rPr lang="en-GB" sz="1400" dirty="0">
-                          <a:solidFill>
-                            <a:srgbClr val="FF0000"/>
-                          </a:solidFill>
+                        <a:rPr lang="en-ZA" sz="1400" dirty="0">
                           <a:effectLst/>
                           <a:latin typeface="Arial" panose="020B0604020202020204" pitchFamily="34" charset="0"/>
                           <a:ea typeface="Times New Roman" panose="02020603050405020304" pitchFamily="18" charset="0"/>
                           <a:cs typeface="Arial" panose="020B0604020202020204" pitchFamily="34" charset="0"/>
                         </a:rPr>
-                        <a:t>Complete dates</a:t>
+                        <a:t>2018-10-25</a:t>
                       </a:r>
-                      <a:endParaRPr lang="en-ZA" sz="1100" dirty="0">
-                        <a:effectLst/>
-                        <a:latin typeface="Arial" panose="020B0604020202020204" pitchFamily="34" charset="0"/>
-                        <a:ea typeface="Times New Roman" panose="02020603050405020304" pitchFamily="18" charset="0"/>
-                        <a:cs typeface="Arial" panose="020B0604020202020204" pitchFamily="34" charset="0"/>
-                      </a:endParaRPr>
                     </a:p>
                   </a:txBody>
                   <a:tcPr marL="68580" marR="68580" marT="0" marB="0">

</xml_diff>